<commit_message>
Completed adding new function end point
</commit_message>
<xml_diff>
--- a/python-azure-func-101/docs/python_azure_function.pptx
+++ b/python-azure-func-101/docs/python_azure_function.pptx
@@ -7,6 +7,7 @@
   <p:sldIdLst>
     <p:sldId id="256" r:id="rId2"/>
     <p:sldId id="257" r:id="rId3"/>
+    <p:sldId id="258" r:id="rId4"/>
   </p:sldIdLst>
   <p:sldSz cx="12192000" cy="6858000"/>
   <p:notesSz cx="6858000" cy="9144000"/>
@@ -105,6 +106,11 @@
       </a:defRPr>
     </a:lvl9pPr>
   </p:defaultTextStyle>
+  <p:extLst>
+    <p:ext uri="{EFAFB233-063F-42B5-8137-9DF3F51BA10A}">
+      <p15:sldGuideLst xmlns:p15="http://schemas.microsoft.com/office/powerpoint/2012/main"/>
+    </p:ext>
+  </p:extLst>
 </p:presentation>
 </file>
 
@@ -257,7 +263,7 @@
           <a:p>
             <a:fld id="{847B66B0-0D3B-4809-9D9D-FD24D33B71E6}" type="datetimeFigureOut">
               <a:rPr lang="en-GB" smtClean="0"/>
-              <a:t>12/04/2022</a:t>
+              <a:t>13/04/2022</a:t>
             </a:fld>
             <a:endParaRPr lang="en-GB"/>
           </a:p>
@@ -457,7 +463,7 @@
           <a:p>
             <a:fld id="{847B66B0-0D3B-4809-9D9D-FD24D33B71E6}" type="datetimeFigureOut">
               <a:rPr lang="en-GB" smtClean="0"/>
-              <a:t>12/04/2022</a:t>
+              <a:t>13/04/2022</a:t>
             </a:fld>
             <a:endParaRPr lang="en-GB"/>
           </a:p>
@@ -667,7 +673,7 @@
           <a:p>
             <a:fld id="{847B66B0-0D3B-4809-9D9D-FD24D33B71E6}" type="datetimeFigureOut">
               <a:rPr lang="en-GB" smtClean="0"/>
-              <a:t>12/04/2022</a:t>
+              <a:t>13/04/2022</a:t>
             </a:fld>
             <a:endParaRPr lang="en-GB"/>
           </a:p>
@@ -867,7 +873,7 @@
           <a:p>
             <a:fld id="{847B66B0-0D3B-4809-9D9D-FD24D33B71E6}" type="datetimeFigureOut">
               <a:rPr lang="en-GB" smtClean="0"/>
-              <a:t>12/04/2022</a:t>
+              <a:t>13/04/2022</a:t>
             </a:fld>
             <a:endParaRPr lang="en-GB"/>
           </a:p>
@@ -1143,7 +1149,7 @@
           <a:p>
             <a:fld id="{847B66B0-0D3B-4809-9D9D-FD24D33B71E6}" type="datetimeFigureOut">
               <a:rPr lang="en-GB" smtClean="0"/>
-              <a:t>12/04/2022</a:t>
+              <a:t>13/04/2022</a:t>
             </a:fld>
             <a:endParaRPr lang="en-GB"/>
           </a:p>
@@ -1411,7 +1417,7 @@
           <a:p>
             <a:fld id="{847B66B0-0D3B-4809-9D9D-FD24D33B71E6}" type="datetimeFigureOut">
               <a:rPr lang="en-GB" smtClean="0"/>
-              <a:t>12/04/2022</a:t>
+              <a:t>13/04/2022</a:t>
             </a:fld>
             <a:endParaRPr lang="en-GB"/>
           </a:p>
@@ -1826,7 +1832,7 @@
           <a:p>
             <a:fld id="{847B66B0-0D3B-4809-9D9D-FD24D33B71E6}" type="datetimeFigureOut">
               <a:rPr lang="en-GB" smtClean="0"/>
-              <a:t>12/04/2022</a:t>
+              <a:t>13/04/2022</a:t>
             </a:fld>
             <a:endParaRPr lang="en-GB"/>
           </a:p>
@@ -1968,7 +1974,7 @@
           <a:p>
             <a:fld id="{847B66B0-0D3B-4809-9D9D-FD24D33B71E6}" type="datetimeFigureOut">
               <a:rPr lang="en-GB" smtClean="0"/>
-              <a:t>12/04/2022</a:t>
+              <a:t>13/04/2022</a:t>
             </a:fld>
             <a:endParaRPr lang="en-GB"/>
           </a:p>
@@ -2081,7 +2087,7 @@
           <a:p>
             <a:fld id="{847B66B0-0D3B-4809-9D9D-FD24D33B71E6}" type="datetimeFigureOut">
               <a:rPr lang="en-GB" smtClean="0"/>
-              <a:t>12/04/2022</a:t>
+              <a:t>13/04/2022</a:t>
             </a:fld>
             <a:endParaRPr lang="en-GB"/>
           </a:p>
@@ -2394,7 +2400,7 @@
           <a:p>
             <a:fld id="{847B66B0-0D3B-4809-9D9D-FD24D33B71E6}" type="datetimeFigureOut">
               <a:rPr lang="en-GB" smtClean="0"/>
-              <a:t>12/04/2022</a:t>
+              <a:t>13/04/2022</a:t>
             </a:fld>
             <a:endParaRPr lang="en-GB"/>
           </a:p>
@@ -2683,7 +2689,7 @@
           <a:p>
             <a:fld id="{847B66B0-0D3B-4809-9D9D-FD24D33B71E6}" type="datetimeFigureOut">
               <a:rPr lang="en-GB" smtClean="0"/>
-              <a:t>12/04/2022</a:t>
+              <a:t>13/04/2022</a:t>
             </a:fld>
             <a:endParaRPr lang="en-GB"/>
           </a:p>
@@ -2926,7 +2932,7 @@
           <a:p>
             <a:fld id="{847B66B0-0D3B-4809-9D9D-FD24D33B71E6}" type="datetimeFigureOut">
               <a:rPr lang="en-GB" smtClean="0"/>
-              <a:t>12/04/2022</a:t>
+              <a:t>13/04/2022</a:t>
             </a:fld>
             <a:endParaRPr lang="en-GB"/>
           </a:p>
@@ -4249,6 +4255,1333 @@
 </p:sld>
 </file>
 
+<file path=ppt/slides/slide3.xml><?xml version="1.0" encoding="utf-8"?>
+<p:sld xmlns:a="http://schemas.openxmlformats.org/drawingml/2006/main" xmlns:r="http://schemas.openxmlformats.org/officeDocument/2006/relationships" xmlns:p="http://schemas.openxmlformats.org/presentationml/2006/main">
+  <p:cSld>
+    <p:spTree>
+      <p:nvGrpSpPr>
+        <p:cNvPr id="1" name=""/>
+        <p:cNvGrpSpPr/>
+        <p:nvPr/>
+      </p:nvGrpSpPr>
+      <p:grpSpPr>
+        <a:xfrm>
+          <a:off x="0" y="0"/>
+          <a:ext cx="0" cy="0"/>
+          <a:chOff x="0" y="0"/>
+          <a:chExt cx="0" cy="0"/>
+        </a:xfrm>
+      </p:grpSpPr>
+      <p:pic>
+        <p:nvPicPr>
+          <p:cNvPr id="3" name="Picture 2">
+            <a:extLst>
+              <a:ext uri="{FF2B5EF4-FFF2-40B4-BE49-F238E27FC236}">
+                <a16:creationId xmlns:a16="http://schemas.microsoft.com/office/drawing/2014/main" id="{1B7989AE-BB81-4B1D-AAB3-4EDE7CB4E160}"/>
+              </a:ext>
+            </a:extLst>
+          </p:cNvPr>
+          <p:cNvPicPr>
+            <a:picLocks noChangeAspect="1"/>
+          </p:cNvPicPr>
+          <p:nvPr/>
+        </p:nvPicPr>
+        <p:blipFill>
+          <a:blip r:embed="rId2"/>
+          <a:stretch>
+            <a:fillRect/>
+          </a:stretch>
+        </p:blipFill>
+        <p:spPr>
+          <a:xfrm>
+            <a:off x="3875105" y="532206"/>
+            <a:ext cx="4495800" cy="5781675"/>
+          </a:xfrm>
+          <a:prstGeom prst="rect">
+            <a:avLst/>
+          </a:prstGeom>
+        </p:spPr>
+      </p:pic>
+      <p:sp>
+        <p:nvSpPr>
+          <p:cNvPr id="4" name="TextBox 3">
+            <a:extLst>
+              <a:ext uri="{FF2B5EF4-FFF2-40B4-BE49-F238E27FC236}">
+                <a16:creationId xmlns:a16="http://schemas.microsoft.com/office/drawing/2014/main" id="{8B135718-BCDA-4467-AC7D-D0E3DF79B567}"/>
+              </a:ext>
+            </a:extLst>
+          </p:cNvPr>
+          <p:cNvSpPr txBox="1"/>
+          <p:nvPr/>
+        </p:nvSpPr>
+        <p:spPr>
+          <a:xfrm>
+            <a:off x="301841" y="2805344"/>
+            <a:ext cx="2121763" cy="369332"/>
+          </a:xfrm>
+          <a:prstGeom prst="rect">
+            <a:avLst/>
+          </a:prstGeom>
+          <a:noFill/>
+          <a:ln>
+            <a:solidFill>
+              <a:srgbClr val="92D050"/>
+            </a:solidFill>
+          </a:ln>
+        </p:spPr>
+        <p:txBody>
+          <a:bodyPr wrap="square" rtlCol="0">
+            <a:spAutoFit/>
+          </a:bodyPr>
+          <a:lstStyle/>
+          <a:p>
+            <a:r>
+              <a:rPr lang="en-GB" dirty="0"/>
+              <a:t>Http end points</a:t>
+            </a:r>
+          </a:p>
+        </p:txBody>
+      </p:sp>
+      <p:cxnSp>
+        <p:nvCxnSpPr>
+          <p:cNvPr id="6" name="Straight Arrow Connector 5">
+            <a:extLst>
+              <a:ext uri="{FF2B5EF4-FFF2-40B4-BE49-F238E27FC236}">
+                <a16:creationId xmlns:a16="http://schemas.microsoft.com/office/drawing/2014/main" id="{EF0C5DEA-0E64-4B36-9CD6-B67B025DFFF8}"/>
+              </a:ext>
+            </a:extLst>
+          </p:cNvPr>
+          <p:cNvCxnSpPr>
+            <a:stCxn id="4" idx="3"/>
+          </p:cNvCxnSpPr>
+          <p:nvPr/>
+        </p:nvCxnSpPr>
+        <p:spPr>
+          <a:xfrm flipV="1">
+            <a:off x="2423604" y="2015231"/>
+            <a:ext cx="1553592" cy="974779"/>
+          </a:xfrm>
+          <a:prstGeom prst="straightConnector1">
+            <a:avLst/>
+          </a:prstGeom>
+          <a:ln>
+            <a:tailEnd type="triangle"/>
+          </a:ln>
+        </p:spPr>
+        <p:style>
+          <a:lnRef idx="1">
+            <a:schemeClr val="accent1"/>
+          </a:lnRef>
+          <a:fillRef idx="0">
+            <a:schemeClr val="accent1"/>
+          </a:fillRef>
+          <a:effectRef idx="0">
+            <a:schemeClr val="accent1"/>
+          </a:effectRef>
+          <a:fontRef idx="minor">
+            <a:schemeClr val="tx1"/>
+          </a:fontRef>
+        </p:style>
+      </p:cxnSp>
+      <p:sp>
+        <p:nvSpPr>
+          <p:cNvPr id="7" name="Rectangle 6">
+            <a:extLst>
+              <a:ext uri="{FF2B5EF4-FFF2-40B4-BE49-F238E27FC236}">
+                <a16:creationId xmlns:a16="http://schemas.microsoft.com/office/drawing/2014/main" id="{EB634702-F709-45DC-BABF-7B7AC131B379}"/>
+              </a:ext>
+            </a:extLst>
+          </p:cNvPr>
+          <p:cNvSpPr/>
+          <p:nvPr/>
+        </p:nvSpPr>
+        <p:spPr>
+          <a:xfrm>
+            <a:off x="4025653" y="1830565"/>
+            <a:ext cx="1376039" cy="300076"/>
+          </a:xfrm>
+          <a:prstGeom prst="rect">
+            <a:avLst/>
+          </a:prstGeom>
+          <a:noFill/>
+          <a:ln>
+            <a:solidFill>
+              <a:srgbClr val="92D050"/>
+            </a:solidFill>
+          </a:ln>
+        </p:spPr>
+        <p:style>
+          <a:lnRef idx="2">
+            <a:schemeClr val="accent1">
+              <a:shade val="50000"/>
+            </a:schemeClr>
+          </a:lnRef>
+          <a:fillRef idx="1">
+            <a:schemeClr val="accent1"/>
+          </a:fillRef>
+          <a:effectRef idx="0">
+            <a:schemeClr val="accent1"/>
+          </a:effectRef>
+          <a:fontRef idx="minor">
+            <a:schemeClr val="lt1"/>
+          </a:fontRef>
+        </p:style>
+        <p:txBody>
+          <a:bodyPr rtlCol="0" anchor="ctr"/>
+          <a:lstStyle/>
+          <a:p>
+            <a:pPr algn="ctr"/>
+            <a:endParaRPr lang="en-GB"/>
+          </a:p>
+        </p:txBody>
+      </p:sp>
+      <p:sp>
+        <p:nvSpPr>
+          <p:cNvPr id="8" name="Rectangle 7">
+            <a:extLst>
+              <a:ext uri="{FF2B5EF4-FFF2-40B4-BE49-F238E27FC236}">
+                <a16:creationId xmlns:a16="http://schemas.microsoft.com/office/drawing/2014/main" id="{D0DE219A-6B42-467E-96B6-63A7FF43E52D}"/>
+              </a:ext>
+            </a:extLst>
+          </p:cNvPr>
+          <p:cNvSpPr/>
+          <p:nvPr/>
+        </p:nvSpPr>
+        <p:spPr>
+          <a:xfrm>
+            <a:off x="4025652" y="3122968"/>
+            <a:ext cx="1376039" cy="300076"/>
+          </a:xfrm>
+          <a:prstGeom prst="rect">
+            <a:avLst/>
+          </a:prstGeom>
+          <a:noFill/>
+          <a:ln>
+            <a:solidFill>
+              <a:srgbClr val="92D050"/>
+            </a:solidFill>
+          </a:ln>
+        </p:spPr>
+        <p:style>
+          <a:lnRef idx="2">
+            <a:schemeClr val="accent1">
+              <a:shade val="50000"/>
+            </a:schemeClr>
+          </a:lnRef>
+          <a:fillRef idx="1">
+            <a:schemeClr val="accent1"/>
+          </a:fillRef>
+          <a:effectRef idx="0">
+            <a:schemeClr val="accent1"/>
+          </a:effectRef>
+          <a:fontRef idx="minor">
+            <a:schemeClr val="lt1"/>
+          </a:fontRef>
+        </p:style>
+        <p:txBody>
+          <a:bodyPr rtlCol="0" anchor="ctr"/>
+          <a:lstStyle/>
+          <a:p>
+            <a:pPr algn="ctr"/>
+            <a:endParaRPr lang="en-GB"/>
+          </a:p>
+        </p:txBody>
+      </p:sp>
+      <p:cxnSp>
+        <p:nvCxnSpPr>
+          <p:cNvPr id="9" name="Straight Arrow Connector 8">
+            <a:extLst>
+              <a:ext uri="{FF2B5EF4-FFF2-40B4-BE49-F238E27FC236}">
+                <a16:creationId xmlns:a16="http://schemas.microsoft.com/office/drawing/2014/main" id="{4ABFC282-6257-454D-B0A1-EAF49367FA8D}"/>
+              </a:ext>
+            </a:extLst>
+          </p:cNvPr>
+          <p:cNvCxnSpPr>
+            <a:cxnSpLocks/>
+            <a:stCxn id="4" idx="3"/>
+            <a:endCxn id="8" idx="1"/>
+          </p:cNvCxnSpPr>
+          <p:nvPr/>
+        </p:nvCxnSpPr>
+        <p:spPr>
+          <a:xfrm>
+            <a:off x="2423604" y="2990010"/>
+            <a:ext cx="1602048" cy="282996"/>
+          </a:xfrm>
+          <a:prstGeom prst="straightConnector1">
+            <a:avLst/>
+          </a:prstGeom>
+          <a:ln>
+            <a:tailEnd type="triangle"/>
+          </a:ln>
+        </p:spPr>
+        <p:style>
+          <a:lnRef idx="1">
+            <a:schemeClr val="accent1"/>
+          </a:lnRef>
+          <a:fillRef idx="0">
+            <a:schemeClr val="accent1"/>
+          </a:fillRef>
+          <a:effectRef idx="0">
+            <a:schemeClr val="accent1"/>
+          </a:effectRef>
+          <a:fontRef idx="minor">
+            <a:schemeClr val="tx1"/>
+          </a:fontRef>
+        </p:style>
+      </p:cxnSp>
+      <p:sp>
+        <p:nvSpPr>
+          <p:cNvPr id="12" name="TextBox 11">
+            <a:extLst>
+              <a:ext uri="{FF2B5EF4-FFF2-40B4-BE49-F238E27FC236}">
+                <a16:creationId xmlns:a16="http://schemas.microsoft.com/office/drawing/2014/main" id="{E6EA04B5-256A-4D06-AA24-9BE901DE4B3A}"/>
+              </a:ext>
+            </a:extLst>
+          </p:cNvPr>
+          <p:cNvSpPr txBox="1"/>
+          <p:nvPr/>
+        </p:nvSpPr>
+        <p:spPr>
+          <a:xfrm>
+            <a:off x="9101092" y="2620678"/>
+            <a:ext cx="2121763" cy="923330"/>
+          </a:xfrm>
+          <a:prstGeom prst="rect">
+            <a:avLst/>
+          </a:prstGeom>
+          <a:noFill/>
+          <a:ln>
+            <a:solidFill>
+              <a:srgbClr val="FF0000"/>
+            </a:solidFill>
+          </a:ln>
+        </p:spPr>
+        <p:txBody>
+          <a:bodyPr wrap="square" rtlCol="0">
+            <a:spAutoFit/>
+          </a:bodyPr>
+          <a:lstStyle/>
+          <a:p>
+            <a:r>
+              <a:rPr lang="en-GB" dirty="0"/>
+              <a:t>Behaviour of the end point (get, post, etc. security)</a:t>
+            </a:r>
+          </a:p>
+        </p:txBody>
+      </p:sp>
+      <p:sp>
+        <p:nvSpPr>
+          <p:cNvPr id="13" name="Rectangle 12">
+            <a:extLst>
+              <a:ext uri="{FF2B5EF4-FFF2-40B4-BE49-F238E27FC236}">
+                <a16:creationId xmlns:a16="http://schemas.microsoft.com/office/drawing/2014/main" id="{32C7B5AA-8FDC-4499-8D16-6E8C3ADDA422}"/>
+              </a:ext>
+            </a:extLst>
+          </p:cNvPr>
+          <p:cNvSpPr/>
+          <p:nvPr/>
+        </p:nvSpPr>
+        <p:spPr>
+          <a:xfrm>
+            <a:off x="4545367" y="2606375"/>
+            <a:ext cx="1376039" cy="300076"/>
+          </a:xfrm>
+          <a:prstGeom prst="rect">
+            <a:avLst/>
+          </a:prstGeom>
+          <a:noFill/>
+          <a:ln>
+            <a:solidFill>
+              <a:srgbClr val="FF0000"/>
+            </a:solidFill>
+          </a:ln>
+        </p:spPr>
+        <p:style>
+          <a:lnRef idx="2">
+            <a:schemeClr val="accent1">
+              <a:shade val="50000"/>
+            </a:schemeClr>
+          </a:lnRef>
+          <a:fillRef idx="1">
+            <a:schemeClr val="accent1"/>
+          </a:fillRef>
+          <a:effectRef idx="0">
+            <a:schemeClr val="accent1"/>
+          </a:effectRef>
+          <a:fontRef idx="minor">
+            <a:schemeClr val="lt1"/>
+          </a:fontRef>
+        </p:style>
+        <p:txBody>
+          <a:bodyPr rtlCol="0" anchor="ctr"/>
+          <a:lstStyle/>
+          <a:p>
+            <a:pPr algn="ctr"/>
+            <a:endParaRPr lang="en-GB"/>
+          </a:p>
+        </p:txBody>
+      </p:sp>
+      <p:sp>
+        <p:nvSpPr>
+          <p:cNvPr id="16" name="Rectangle 15">
+            <a:extLst>
+              <a:ext uri="{FF2B5EF4-FFF2-40B4-BE49-F238E27FC236}">
+                <a16:creationId xmlns:a16="http://schemas.microsoft.com/office/drawing/2014/main" id="{EA58B66A-AB57-4D29-9168-C5BE911CA9F0}"/>
+              </a:ext>
+            </a:extLst>
+          </p:cNvPr>
+          <p:cNvSpPr/>
+          <p:nvPr/>
+        </p:nvSpPr>
+        <p:spPr>
+          <a:xfrm>
+            <a:off x="4545366" y="3898778"/>
+            <a:ext cx="1376039" cy="300076"/>
+          </a:xfrm>
+          <a:prstGeom prst="rect">
+            <a:avLst/>
+          </a:prstGeom>
+          <a:noFill/>
+          <a:ln>
+            <a:solidFill>
+              <a:srgbClr val="FF0000"/>
+            </a:solidFill>
+          </a:ln>
+        </p:spPr>
+        <p:style>
+          <a:lnRef idx="2">
+            <a:schemeClr val="accent1">
+              <a:shade val="50000"/>
+            </a:schemeClr>
+          </a:lnRef>
+          <a:fillRef idx="1">
+            <a:schemeClr val="accent1"/>
+          </a:fillRef>
+          <a:effectRef idx="0">
+            <a:schemeClr val="accent1"/>
+          </a:effectRef>
+          <a:fontRef idx="minor">
+            <a:schemeClr val="lt1"/>
+          </a:fontRef>
+        </p:style>
+        <p:txBody>
+          <a:bodyPr rtlCol="0" anchor="ctr"/>
+          <a:lstStyle/>
+          <a:p>
+            <a:pPr algn="ctr"/>
+            <a:endParaRPr lang="en-GB"/>
+          </a:p>
+        </p:txBody>
+      </p:sp>
+      <p:cxnSp>
+        <p:nvCxnSpPr>
+          <p:cNvPr id="17" name="Straight Arrow Connector 16">
+            <a:extLst>
+              <a:ext uri="{FF2B5EF4-FFF2-40B4-BE49-F238E27FC236}">
+                <a16:creationId xmlns:a16="http://schemas.microsoft.com/office/drawing/2014/main" id="{8AA12325-D7E2-41D0-98CA-D9CE344D9D7F}"/>
+              </a:ext>
+            </a:extLst>
+          </p:cNvPr>
+          <p:cNvCxnSpPr>
+            <a:cxnSpLocks/>
+            <a:stCxn id="12" idx="1"/>
+            <a:endCxn id="16" idx="3"/>
+          </p:cNvCxnSpPr>
+          <p:nvPr/>
+        </p:nvCxnSpPr>
+        <p:spPr>
+          <a:xfrm flipH="1">
+            <a:off x="5921405" y="3082343"/>
+            <a:ext cx="3179687" cy="966473"/>
+          </a:xfrm>
+          <a:prstGeom prst="straightConnector1">
+            <a:avLst/>
+          </a:prstGeom>
+          <a:ln>
+            <a:tailEnd type="triangle"/>
+          </a:ln>
+        </p:spPr>
+        <p:style>
+          <a:lnRef idx="1">
+            <a:schemeClr val="accent1"/>
+          </a:lnRef>
+          <a:fillRef idx="0">
+            <a:schemeClr val="accent1"/>
+          </a:fillRef>
+          <a:effectRef idx="0">
+            <a:schemeClr val="accent1"/>
+          </a:effectRef>
+          <a:fontRef idx="minor">
+            <a:schemeClr val="tx1"/>
+          </a:fontRef>
+        </p:style>
+      </p:cxnSp>
+      <p:cxnSp>
+        <p:nvCxnSpPr>
+          <p:cNvPr id="20" name="Straight Arrow Connector 19">
+            <a:extLst>
+              <a:ext uri="{FF2B5EF4-FFF2-40B4-BE49-F238E27FC236}">
+                <a16:creationId xmlns:a16="http://schemas.microsoft.com/office/drawing/2014/main" id="{7B391A77-87A2-4D7C-B522-075FE51329DF}"/>
+              </a:ext>
+            </a:extLst>
+          </p:cNvPr>
+          <p:cNvCxnSpPr>
+            <a:cxnSpLocks/>
+            <a:stCxn id="12" idx="1"/>
+            <a:endCxn id="13" idx="3"/>
+          </p:cNvCxnSpPr>
+          <p:nvPr/>
+        </p:nvCxnSpPr>
+        <p:spPr>
+          <a:xfrm flipH="1" flipV="1">
+            <a:off x="5921406" y="2756413"/>
+            <a:ext cx="3179686" cy="325930"/>
+          </a:xfrm>
+          <a:prstGeom prst="straightConnector1">
+            <a:avLst/>
+          </a:prstGeom>
+          <a:ln>
+            <a:tailEnd type="triangle"/>
+          </a:ln>
+        </p:spPr>
+        <p:style>
+          <a:lnRef idx="1">
+            <a:schemeClr val="accent1"/>
+          </a:lnRef>
+          <a:fillRef idx="0">
+            <a:schemeClr val="accent1"/>
+          </a:fillRef>
+          <a:effectRef idx="0">
+            <a:schemeClr val="accent1"/>
+          </a:effectRef>
+          <a:fontRef idx="minor">
+            <a:schemeClr val="tx1"/>
+          </a:fontRef>
+        </p:style>
+      </p:cxnSp>
+      <p:cxnSp>
+        <p:nvCxnSpPr>
+          <p:cNvPr id="24" name="Straight Arrow Connector 23">
+            <a:extLst>
+              <a:ext uri="{FF2B5EF4-FFF2-40B4-BE49-F238E27FC236}">
+                <a16:creationId xmlns:a16="http://schemas.microsoft.com/office/drawing/2014/main" id="{146F2716-AF63-49F8-AA76-4E400AAED4E9}"/>
+              </a:ext>
+            </a:extLst>
+          </p:cNvPr>
+          <p:cNvCxnSpPr>
+            <a:cxnSpLocks/>
+            <a:stCxn id="28" idx="3"/>
+            <a:endCxn id="25" idx="1"/>
+          </p:cNvCxnSpPr>
+          <p:nvPr/>
+        </p:nvCxnSpPr>
+        <p:spPr>
+          <a:xfrm flipV="1">
+            <a:off x="2291919" y="4568386"/>
+            <a:ext cx="1733732" cy="484600"/>
+          </a:xfrm>
+          <a:prstGeom prst="straightConnector1">
+            <a:avLst/>
+          </a:prstGeom>
+          <a:ln>
+            <a:tailEnd type="triangle"/>
+          </a:ln>
+        </p:spPr>
+        <p:style>
+          <a:lnRef idx="1">
+            <a:schemeClr val="accent1"/>
+          </a:lnRef>
+          <a:fillRef idx="0">
+            <a:schemeClr val="accent1"/>
+          </a:fillRef>
+          <a:effectRef idx="0">
+            <a:schemeClr val="accent1"/>
+          </a:effectRef>
+          <a:fontRef idx="minor">
+            <a:schemeClr val="tx1"/>
+          </a:fontRef>
+        </p:style>
+      </p:cxnSp>
+      <p:sp>
+        <p:nvSpPr>
+          <p:cNvPr id="25" name="Rectangle 24">
+            <a:extLst>
+              <a:ext uri="{FF2B5EF4-FFF2-40B4-BE49-F238E27FC236}">
+                <a16:creationId xmlns:a16="http://schemas.microsoft.com/office/drawing/2014/main" id="{3FDFDE8D-5BAE-4AFD-8F0A-BD8D5EBE8565}"/>
+              </a:ext>
+            </a:extLst>
+          </p:cNvPr>
+          <p:cNvSpPr/>
+          <p:nvPr/>
+        </p:nvSpPr>
+        <p:spPr>
+          <a:xfrm>
+            <a:off x="4025651" y="4418348"/>
+            <a:ext cx="1376039" cy="300076"/>
+          </a:xfrm>
+          <a:prstGeom prst="rect">
+            <a:avLst/>
+          </a:prstGeom>
+          <a:noFill/>
+          <a:ln>
+            <a:solidFill>
+              <a:srgbClr val="FF0000"/>
+            </a:solidFill>
+          </a:ln>
+        </p:spPr>
+        <p:style>
+          <a:lnRef idx="2">
+            <a:schemeClr val="accent1">
+              <a:shade val="50000"/>
+            </a:schemeClr>
+          </a:lnRef>
+          <a:fillRef idx="1">
+            <a:schemeClr val="accent1"/>
+          </a:fillRef>
+          <a:effectRef idx="0">
+            <a:schemeClr val="accent1"/>
+          </a:effectRef>
+          <a:fontRef idx="minor">
+            <a:schemeClr val="lt1"/>
+          </a:fontRef>
+        </p:style>
+        <p:txBody>
+          <a:bodyPr rtlCol="0" anchor="ctr"/>
+          <a:lstStyle/>
+          <a:p>
+            <a:pPr algn="ctr"/>
+            <a:endParaRPr lang="en-GB" dirty="0"/>
+          </a:p>
+        </p:txBody>
+      </p:sp>
+      <p:sp>
+        <p:nvSpPr>
+          <p:cNvPr id="26" name="Rectangle 25">
+            <a:extLst>
+              <a:ext uri="{FF2B5EF4-FFF2-40B4-BE49-F238E27FC236}">
+                <a16:creationId xmlns:a16="http://schemas.microsoft.com/office/drawing/2014/main" id="{04CAAB91-A92A-437E-BE95-AF3763A5D4D1}"/>
+              </a:ext>
+            </a:extLst>
+          </p:cNvPr>
+          <p:cNvSpPr/>
+          <p:nvPr/>
+        </p:nvSpPr>
+        <p:spPr>
+          <a:xfrm>
+            <a:off x="11755515" y="0"/>
+            <a:ext cx="1376039" cy="300076"/>
+          </a:xfrm>
+          <a:prstGeom prst="rect">
+            <a:avLst/>
+          </a:prstGeom>
+          <a:noFill/>
+          <a:ln>
+            <a:solidFill>
+              <a:srgbClr val="FF0000"/>
+            </a:solidFill>
+          </a:ln>
+        </p:spPr>
+        <p:style>
+          <a:lnRef idx="2">
+            <a:schemeClr val="accent1">
+              <a:shade val="50000"/>
+            </a:schemeClr>
+          </a:lnRef>
+          <a:fillRef idx="1">
+            <a:schemeClr val="accent1"/>
+          </a:fillRef>
+          <a:effectRef idx="0">
+            <a:schemeClr val="accent1"/>
+          </a:effectRef>
+          <a:fontRef idx="minor">
+            <a:schemeClr val="lt1"/>
+          </a:fontRef>
+        </p:style>
+        <p:txBody>
+          <a:bodyPr rtlCol="0" anchor="ctr"/>
+          <a:lstStyle/>
+          <a:p>
+            <a:pPr algn="ctr"/>
+            <a:endParaRPr lang="en-GB" dirty="0"/>
+          </a:p>
+        </p:txBody>
+      </p:sp>
+      <p:sp>
+        <p:nvSpPr>
+          <p:cNvPr id="28" name="TextBox 27">
+            <a:extLst>
+              <a:ext uri="{FF2B5EF4-FFF2-40B4-BE49-F238E27FC236}">
+                <a16:creationId xmlns:a16="http://schemas.microsoft.com/office/drawing/2014/main" id="{F4742DE5-BA75-47EE-A823-DF99CF86A92B}"/>
+              </a:ext>
+            </a:extLst>
+          </p:cNvPr>
+          <p:cNvSpPr txBox="1"/>
+          <p:nvPr/>
+        </p:nvSpPr>
+        <p:spPr>
+          <a:xfrm>
+            <a:off x="170156" y="4868320"/>
+            <a:ext cx="2121763" cy="369332"/>
+          </a:xfrm>
+          <a:prstGeom prst="rect">
+            <a:avLst/>
+          </a:prstGeom>
+          <a:noFill/>
+          <a:ln>
+            <a:solidFill>
+              <a:srgbClr val="92D050"/>
+            </a:solidFill>
+          </a:ln>
+        </p:spPr>
+        <p:txBody>
+          <a:bodyPr wrap="square" rtlCol="0">
+            <a:spAutoFit/>
+          </a:bodyPr>
+          <a:lstStyle/>
+          <a:p>
+            <a:r>
+              <a:rPr lang="en-GB" dirty="0"/>
+              <a:t>Re-usable classes</a:t>
+            </a:r>
+          </a:p>
+        </p:txBody>
+      </p:sp>
+      <p:sp>
+        <p:nvSpPr>
+          <p:cNvPr id="30" name="Rectangle 29">
+            <a:extLst>
+              <a:ext uri="{FF2B5EF4-FFF2-40B4-BE49-F238E27FC236}">
+                <a16:creationId xmlns:a16="http://schemas.microsoft.com/office/drawing/2014/main" id="{A6F29C0E-B397-459B-AAE7-F4309060B8D6}"/>
+              </a:ext>
+            </a:extLst>
+          </p:cNvPr>
+          <p:cNvSpPr/>
+          <p:nvPr/>
+        </p:nvSpPr>
+        <p:spPr>
+          <a:xfrm>
+            <a:off x="4034525" y="4752368"/>
+            <a:ext cx="1376039" cy="226891"/>
+          </a:xfrm>
+          <a:prstGeom prst="rect">
+            <a:avLst/>
+          </a:prstGeom>
+          <a:noFill/>
+          <a:ln>
+            <a:solidFill>
+              <a:srgbClr val="FF0000"/>
+            </a:solidFill>
+          </a:ln>
+        </p:spPr>
+        <p:style>
+          <a:lnRef idx="2">
+            <a:schemeClr val="accent1">
+              <a:shade val="50000"/>
+            </a:schemeClr>
+          </a:lnRef>
+          <a:fillRef idx="1">
+            <a:schemeClr val="accent1"/>
+          </a:fillRef>
+          <a:effectRef idx="0">
+            <a:schemeClr val="accent1"/>
+          </a:effectRef>
+          <a:fontRef idx="minor">
+            <a:schemeClr val="lt1"/>
+          </a:fontRef>
+        </p:style>
+        <p:txBody>
+          <a:bodyPr rtlCol="0" anchor="ctr"/>
+          <a:lstStyle/>
+          <a:p>
+            <a:pPr algn="ctr"/>
+            <a:endParaRPr lang="en-GB" dirty="0"/>
+          </a:p>
+        </p:txBody>
+      </p:sp>
+      <p:cxnSp>
+        <p:nvCxnSpPr>
+          <p:cNvPr id="31" name="Straight Arrow Connector 30">
+            <a:extLst>
+              <a:ext uri="{FF2B5EF4-FFF2-40B4-BE49-F238E27FC236}">
+                <a16:creationId xmlns:a16="http://schemas.microsoft.com/office/drawing/2014/main" id="{0A4BDCAE-E39A-4301-9D72-9FCDA9DD1915}"/>
+              </a:ext>
+            </a:extLst>
+          </p:cNvPr>
+          <p:cNvCxnSpPr>
+            <a:cxnSpLocks/>
+          </p:cNvCxnSpPr>
+          <p:nvPr/>
+        </p:nvCxnSpPr>
+        <p:spPr>
+          <a:xfrm flipV="1">
+            <a:off x="2291919" y="4933667"/>
+            <a:ext cx="1733732" cy="484600"/>
+          </a:xfrm>
+          <a:prstGeom prst="straightConnector1">
+            <a:avLst/>
+          </a:prstGeom>
+          <a:ln>
+            <a:tailEnd type="triangle"/>
+          </a:ln>
+        </p:spPr>
+        <p:style>
+          <a:lnRef idx="1">
+            <a:schemeClr val="accent1"/>
+          </a:lnRef>
+          <a:fillRef idx="0">
+            <a:schemeClr val="accent1"/>
+          </a:fillRef>
+          <a:effectRef idx="0">
+            <a:schemeClr val="accent1"/>
+          </a:effectRef>
+          <a:fontRef idx="minor">
+            <a:schemeClr val="tx1"/>
+          </a:fontRef>
+        </p:style>
+      </p:cxnSp>
+      <p:sp>
+        <p:nvSpPr>
+          <p:cNvPr id="32" name="TextBox 31">
+            <a:extLst>
+              <a:ext uri="{FF2B5EF4-FFF2-40B4-BE49-F238E27FC236}">
+                <a16:creationId xmlns:a16="http://schemas.microsoft.com/office/drawing/2014/main" id="{DAF77E6A-60B0-46D1-AEB1-A15F641A3E3F}"/>
+              </a:ext>
+            </a:extLst>
+          </p:cNvPr>
+          <p:cNvSpPr txBox="1"/>
+          <p:nvPr/>
+        </p:nvSpPr>
+        <p:spPr>
+          <a:xfrm>
+            <a:off x="170155" y="5352920"/>
+            <a:ext cx="2121763" cy="369332"/>
+          </a:xfrm>
+          <a:prstGeom prst="rect">
+            <a:avLst/>
+          </a:prstGeom>
+          <a:noFill/>
+          <a:ln>
+            <a:solidFill>
+              <a:srgbClr val="92D050"/>
+            </a:solidFill>
+          </a:ln>
+        </p:spPr>
+        <p:txBody>
+          <a:bodyPr wrap="square" rtlCol="0">
+            <a:spAutoFit/>
+          </a:bodyPr>
+          <a:lstStyle/>
+          <a:p>
+            <a:r>
+              <a:rPr lang="en-GB" dirty="0"/>
+              <a:t>Unit tests</a:t>
+            </a:r>
+          </a:p>
+        </p:txBody>
+      </p:sp>
+      <p:sp>
+        <p:nvSpPr>
+          <p:cNvPr id="33" name="Rectangle 32">
+            <a:extLst>
+              <a:ext uri="{FF2B5EF4-FFF2-40B4-BE49-F238E27FC236}">
+                <a16:creationId xmlns:a16="http://schemas.microsoft.com/office/drawing/2014/main" id="{09CF10CD-BC9A-4C81-AF8C-034BEFBC410B}"/>
+              </a:ext>
+            </a:extLst>
+          </p:cNvPr>
+          <p:cNvSpPr/>
+          <p:nvPr/>
+        </p:nvSpPr>
+        <p:spPr>
+          <a:xfrm>
+            <a:off x="3977196" y="5447814"/>
+            <a:ext cx="1376039" cy="300076"/>
+          </a:xfrm>
+          <a:prstGeom prst="rect">
+            <a:avLst/>
+          </a:prstGeom>
+          <a:noFill/>
+          <a:ln>
+            <a:solidFill>
+              <a:srgbClr val="FF0000"/>
+            </a:solidFill>
+          </a:ln>
+        </p:spPr>
+        <p:style>
+          <a:lnRef idx="2">
+            <a:schemeClr val="accent1">
+              <a:shade val="50000"/>
+            </a:schemeClr>
+          </a:lnRef>
+          <a:fillRef idx="1">
+            <a:schemeClr val="accent1"/>
+          </a:fillRef>
+          <a:effectRef idx="0">
+            <a:schemeClr val="accent1"/>
+          </a:effectRef>
+          <a:fontRef idx="minor">
+            <a:schemeClr val="lt1"/>
+          </a:fontRef>
+        </p:style>
+        <p:txBody>
+          <a:bodyPr rtlCol="0" anchor="ctr"/>
+          <a:lstStyle/>
+          <a:p>
+            <a:pPr algn="ctr"/>
+            <a:endParaRPr lang="en-GB" dirty="0"/>
+          </a:p>
+        </p:txBody>
+      </p:sp>
+      <p:sp>
+        <p:nvSpPr>
+          <p:cNvPr id="34" name="TextBox 33">
+            <a:extLst>
+              <a:ext uri="{FF2B5EF4-FFF2-40B4-BE49-F238E27FC236}">
+                <a16:creationId xmlns:a16="http://schemas.microsoft.com/office/drawing/2014/main" id="{B50BF4EE-549F-4D62-8BC0-689044A2D3D3}"/>
+              </a:ext>
+            </a:extLst>
+          </p:cNvPr>
+          <p:cNvSpPr txBox="1"/>
+          <p:nvPr/>
+        </p:nvSpPr>
+        <p:spPr>
+          <a:xfrm>
+            <a:off x="9101092" y="4626020"/>
+            <a:ext cx="2121763" cy="646331"/>
+          </a:xfrm>
+          <a:prstGeom prst="rect">
+            <a:avLst/>
+          </a:prstGeom>
+          <a:noFill/>
+          <a:ln>
+            <a:solidFill>
+              <a:srgbClr val="92D050"/>
+            </a:solidFill>
+          </a:ln>
+        </p:spPr>
+        <p:txBody>
+          <a:bodyPr wrap="square" rtlCol="0">
+            <a:spAutoFit/>
+          </a:bodyPr>
+          <a:lstStyle/>
+          <a:p>
+            <a:r>
+              <a:rPr lang="en-GB" dirty="0"/>
+              <a:t>Runtime config, logging, etc.</a:t>
+            </a:r>
+          </a:p>
+        </p:txBody>
+      </p:sp>
+      <p:cxnSp>
+        <p:nvCxnSpPr>
+          <p:cNvPr id="35" name="Straight Arrow Connector 34">
+            <a:extLst>
+              <a:ext uri="{FF2B5EF4-FFF2-40B4-BE49-F238E27FC236}">
+                <a16:creationId xmlns:a16="http://schemas.microsoft.com/office/drawing/2014/main" id="{EC0C8DA2-42AF-43CF-8E21-CE5414288E17}"/>
+              </a:ext>
+            </a:extLst>
+          </p:cNvPr>
+          <p:cNvCxnSpPr>
+            <a:cxnSpLocks/>
+            <a:stCxn id="34" idx="1"/>
+          </p:cNvCxnSpPr>
+          <p:nvPr/>
+        </p:nvCxnSpPr>
+        <p:spPr>
+          <a:xfrm flipH="1">
+            <a:off x="5353235" y="4949186"/>
+            <a:ext cx="3747857" cy="648666"/>
+          </a:xfrm>
+          <a:prstGeom prst="straightConnector1">
+            <a:avLst/>
+          </a:prstGeom>
+          <a:ln>
+            <a:tailEnd type="triangle"/>
+          </a:ln>
+        </p:spPr>
+        <p:style>
+          <a:lnRef idx="1">
+            <a:schemeClr val="accent1"/>
+          </a:lnRef>
+          <a:fillRef idx="0">
+            <a:schemeClr val="accent1"/>
+          </a:fillRef>
+          <a:effectRef idx="0">
+            <a:schemeClr val="accent1"/>
+          </a:effectRef>
+          <a:fontRef idx="minor">
+            <a:schemeClr val="tx1"/>
+          </a:fontRef>
+        </p:style>
+      </p:cxnSp>
+      <p:sp>
+        <p:nvSpPr>
+          <p:cNvPr id="38" name="Rectangle 37">
+            <a:extLst>
+              <a:ext uri="{FF2B5EF4-FFF2-40B4-BE49-F238E27FC236}">
+                <a16:creationId xmlns:a16="http://schemas.microsoft.com/office/drawing/2014/main" id="{1F67AC92-3510-43B6-BAFD-FCFB94D2929B}"/>
+              </a:ext>
+            </a:extLst>
+          </p:cNvPr>
+          <p:cNvSpPr/>
+          <p:nvPr/>
+        </p:nvSpPr>
+        <p:spPr>
+          <a:xfrm>
+            <a:off x="3977196" y="5999847"/>
+            <a:ext cx="1491449" cy="300076"/>
+          </a:xfrm>
+          <a:prstGeom prst="rect">
+            <a:avLst/>
+          </a:prstGeom>
+          <a:noFill/>
+          <a:ln>
+            <a:solidFill>
+              <a:srgbClr val="FF0000"/>
+            </a:solidFill>
+          </a:ln>
+        </p:spPr>
+        <p:style>
+          <a:lnRef idx="2">
+            <a:schemeClr val="accent1">
+              <a:shade val="50000"/>
+            </a:schemeClr>
+          </a:lnRef>
+          <a:fillRef idx="1">
+            <a:schemeClr val="accent1"/>
+          </a:fillRef>
+          <a:effectRef idx="0">
+            <a:schemeClr val="accent1"/>
+          </a:effectRef>
+          <a:fontRef idx="minor">
+            <a:schemeClr val="lt1"/>
+          </a:fontRef>
+        </p:style>
+        <p:txBody>
+          <a:bodyPr rtlCol="0" anchor="ctr"/>
+          <a:lstStyle/>
+          <a:p>
+            <a:pPr algn="ctr"/>
+            <a:endParaRPr lang="en-GB" dirty="0"/>
+          </a:p>
+        </p:txBody>
+      </p:sp>
+      <p:cxnSp>
+        <p:nvCxnSpPr>
+          <p:cNvPr id="41" name="Straight Arrow Connector 40">
+            <a:extLst>
+              <a:ext uri="{FF2B5EF4-FFF2-40B4-BE49-F238E27FC236}">
+                <a16:creationId xmlns:a16="http://schemas.microsoft.com/office/drawing/2014/main" id="{4C4915FF-6483-4D5A-8F75-DECBADE463C4}"/>
+              </a:ext>
+            </a:extLst>
+          </p:cNvPr>
+          <p:cNvCxnSpPr>
+            <a:cxnSpLocks/>
+          </p:cNvCxnSpPr>
+          <p:nvPr/>
+        </p:nvCxnSpPr>
+        <p:spPr>
+          <a:xfrm flipH="1">
+            <a:off x="5353235" y="5525222"/>
+            <a:ext cx="3747857" cy="648666"/>
+          </a:xfrm>
+          <a:prstGeom prst="straightConnector1">
+            <a:avLst/>
+          </a:prstGeom>
+          <a:ln>
+            <a:tailEnd type="triangle"/>
+          </a:ln>
+        </p:spPr>
+        <p:style>
+          <a:lnRef idx="1">
+            <a:schemeClr val="accent1"/>
+          </a:lnRef>
+          <a:fillRef idx="0">
+            <a:schemeClr val="accent1"/>
+          </a:fillRef>
+          <a:effectRef idx="0">
+            <a:schemeClr val="accent1"/>
+          </a:effectRef>
+          <a:fontRef idx="minor">
+            <a:schemeClr val="tx1"/>
+          </a:fontRef>
+        </p:style>
+      </p:cxnSp>
+      <p:sp>
+        <p:nvSpPr>
+          <p:cNvPr id="42" name="TextBox 41">
+            <a:extLst>
+              <a:ext uri="{FF2B5EF4-FFF2-40B4-BE49-F238E27FC236}">
+                <a16:creationId xmlns:a16="http://schemas.microsoft.com/office/drawing/2014/main" id="{169FC28A-C87B-47E7-B639-8928E4C86D42}"/>
+              </a:ext>
+            </a:extLst>
+          </p:cNvPr>
+          <p:cNvSpPr txBox="1"/>
+          <p:nvPr/>
+        </p:nvSpPr>
+        <p:spPr>
+          <a:xfrm>
+            <a:off x="9101092" y="5331872"/>
+            <a:ext cx="2121763" cy="646331"/>
+          </a:xfrm>
+          <a:prstGeom prst="rect">
+            <a:avLst/>
+          </a:prstGeom>
+          <a:noFill/>
+          <a:ln>
+            <a:solidFill>
+              <a:srgbClr val="92D050"/>
+            </a:solidFill>
+          </a:ln>
+        </p:spPr>
+        <p:txBody>
+          <a:bodyPr wrap="square" rtlCol="0">
+            <a:spAutoFit/>
+          </a:bodyPr>
+          <a:lstStyle/>
+          <a:p>
+            <a:r>
+              <a:rPr lang="en-GB" dirty="0"/>
+              <a:t>Python </a:t>
+            </a:r>
+            <a:r>
+              <a:rPr lang="en-GB" dirty="0" err="1"/>
+              <a:t>venv</a:t>
+            </a:r>
+            <a:r>
+              <a:rPr lang="en-GB" dirty="0"/>
+              <a:t> PIP modules</a:t>
+            </a:r>
+          </a:p>
+        </p:txBody>
+      </p:sp>
+      <p:cxnSp>
+        <p:nvCxnSpPr>
+          <p:cNvPr id="43" name="Straight Arrow Connector 42">
+            <a:extLst>
+              <a:ext uri="{FF2B5EF4-FFF2-40B4-BE49-F238E27FC236}">
+                <a16:creationId xmlns:a16="http://schemas.microsoft.com/office/drawing/2014/main" id="{572A12A3-7FA5-4B18-8164-7488C3954C28}"/>
+              </a:ext>
+            </a:extLst>
+          </p:cNvPr>
+          <p:cNvCxnSpPr>
+            <a:cxnSpLocks/>
+          </p:cNvCxnSpPr>
+          <p:nvPr/>
+        </p:nvCxnSpPr>
+        <p:spPr>
+          <a:xfrm flipV="1">
+            <a:off x="2387544" y="5894628"/>
+            <a:ext cx="1733732" cy="484600"/>
+          </a:xfrm>
+          <a:prstGeom prst="straightConnector1">
+            <a:avLst/>
+          </a:prstGeom>
+          <a:ln>
+            <a:tailEnd type="triangle"/>
+          </a:ln>
+        </p:spPr>
+        <p:style>
+          <a:lnRef idx="1">
+            <a:schemeClr val="accent1"/>
+          </a:lnRef>
+          <a:fillRef idx="0">
+            <a:schemeClr val="accent1"/>
+          </a:fillRef>
+          <a:effectRef idx="0">
+            <a:schemeClr val="accent1"/>
+          </a:effectRef>
+          <a:fontRef idx="minor">
+            <a:schemeClr val="tx1"/>
+          </a:fontRef>
+        </p:style>
+      </p:cxnSp>
+      <p:sp>
+        <p:nvSpPr>
+          <p:cNvPr id="44" name="TextBox 43">
+            <a:extLst>
+              <a:ext uri="{FF2B5EF4-FFF2-40B4-BE49-F238E27FC236}">
+                <a16:creationId xmlns:a16="http://schemas.microsoft.com/office/drawing/2014/main" id="{E4DACE77-28D2-496B-9FEA-DBB68C3202DC}"/>
+              </a:ext>
+            </a:extLst>
+          </p:cNvPr>
+          <p:cNvSpPr txBox="1"/>
+          <p:nvPr/>
+        </p:nvSpPr>
+        <p:spPr>
+          <a:xfrm>
+            <a:off x="170155" y="5871218"/>
+            <a:ext cx="2653405" cy="923330"/>
+          </a:xfrm>
+          <a:prstGeom prst="rect">
+            <a:avLst/>
+          </a:prstGeom>
+          <a:noFill/>
+          <a:ln>
+            <a:solidFill>
+              <a:srgbClr val="92D050"/>
+            </a:solidFill>
+          </a:ln>
+        </p:spPr>
+        <p:txBody>
+          <a:bodyPr wrap="square" rtlCol="0">
+            <a:spAutoFit/>
+          </a:bodyPr>
+          <a:lstStyle/>
+          <a:p>
+            <a:r>
+              <a:rPr lang="en-GB" dirty="0"/>
+              <a:t>Environment variables used during local debugging</a:t>
+            </a:r>
+          </a:p>
+        </p:txBody>
+      </p:sp>
+      <p:sp>
+        <p:nvSpPr>
+          <p:cNvPr id="45" name="Rectangle 44">
+            <a:extLst>
+              <a:ext uri="{FF2B5EF4-FFF2-40B4-BE49-F238E27FC236}">
+                <a16:creationId xmlns:a16="http://schemas.microsoft.com/office/drawing/2014/main" id="{A8BE63FE-1B8F-4721-8ABB-55B43D032B02}"/>
+              </a:ext>
+            </a:extLst>
+          </p:cNvPr>
+          <p:cNvSpPr/>
+          <p:nvPr/>
+        </p:nvSpPr>
+        <p:spPr>
+          <a:xfrm>
+            <a:off x="4027126" y="5020182"/>
+            <a:ext cx="1376039" cy="226891"/>
+          </a:xfrm>
+          <a:prstGeom prst="rect">
+            <a:avLst/>
+          </a:prstGeom>
+          <a:noFill/>
+          <a:ln>
+            <a:solidFill>
+              <a:srgbClr val="FF0000"/>
+            </a:solidFill>
+          </a:ln>
+        </p:spPr>
+        <p:style>
+          <a:lnRef idx="2">
+            <a:schemeClr val="accent1">
+              <a:shade val="50000"/>
+            </a:schemeClr>
+          </a:lnRef>
+          <a:fillRef idx="1">
+            <a:schemeClr val="accent1"/>
+          </a:fillRef>
+          <a:effectRef idx="0">
+            <a:schemeClr val="accent1"/>
+          </a:effectRef>
+          <a:fontRef idx="minor">
+            <a:schemeClr val="lt1"/>
+          </a:fontRef>
+        </p:style>
+        <p:txBody>
+          <a:bodyPr rtlCol="0" anchor="ctr"/>
+          <a:lstStyle/>
+          <a:p>
+            <a:pPr algn="ctr"/>
+            <a:endParaRPr lang="en-GB" dirty="0"/>
+          </a:p>
+        </p:txBody>
+      </p:sp>
+      <p:cxnSp>
+        <p:nvCxnSpPr>
+          <p:cNvPr id="46" name="Straight Arrow Connector 45">
+            <a:extLst>
+              <a:ext uri="{FF2B5EF4-FFF2-40B4-BE49-F238E27FC236}">
+                <a16:creationId xmlns:a16="http://schemas.microsoft.com/office/drawing/2014/main" id="{85BD88FE-68C8-413E-82A2-88D0D7917205}"/>
+              </a:ext>
+            </a:extLst>
+          </p:cNvPr>
+          <p:cNvCxnSpPr>
+            <a:cxnSpLocks/>
+          </p:cNvCxnSpPr>
+          <p:nvPr/>
+        </p:nvCxnSpPr>
+        <p:spPr>
+          <a:xfrm flipH="1">
+            <a:off x="5353235" y="4409382"/>
+            <a:ext cx="3747857" cy="648666"/>
+          </a:xfrm>
+          <a:prstGeom prst="straightConnector1">
+            <a:avLst/>
+          </a:prstGeom>
+          <a:ln>
+            <a:tailEnd type="triangle"/>
+          </a:ln>
+        </p:spPr>
+        <p:style>
+          <a:lnRef idx="1">
+            <a:schemeClr val="accent1"/>
+          </a:lnRef>
+          <a:fillRef idx="0">
+            <a:schemeClr val="accent1"/>
+          </a:fillRef>
+          <a:effectRef idx="0">
+            <a:schemeClr val="accent1"/>
+          </a:effectRef>
+          <a:fontRef idx="minor">
+            <a:schemeClr val="tx1"/>
+          </a:fontRef>
+        </p:style>
+      </p:cxnSp>
+      <p:sp>
+        <p:nvSpPr>
+          <p:cNvPr id="47" name="TextBox 46">
+            <a:extLst>
+              <a:ext uri="{FF2B5EF4-FFF2-40B4-BE49-F238E27FC236}">
+                <a16:creationId xmlns:a16="http://schemas.microsoft.com/office/drawing/2014/main" id="{DC104504-A35F-4082-98C6-E44ADE9CC1EA}"/>
+              </a:ext>
+            </a:extLst>
+          </p:cNvPr>
+          <p:cNvSpPr txBox="1"/>
+          <p:nvPr/>
+        </p:nvSpPr>
+        <p:spPr>
+          <a:xfrm>
+            <a:off x="9131802" y="3871370"/>
+            <a:ext cx="2364781" cy="646331"/>
+          </a:xfrm>
+          <a:prstGeom prst="rect">
+            <a:avLst/>
+          </a:prstGeom>
+          <a:noFill/>
+          <a:ln>
+            <a:solidFill>
+              <a:srgbClr val="92D050"/>
+            </a:solidFill>
+          </a:ln>
+        </p:spPr>
+        <p:txBody>
+          <a:bodyPr wrap="square" rtlCol="0">
+            <a:spAutoFit/>
+          </a:bodyPr>
+          <a:lstStyle/>
+          <a:p>
+            <a:r>
+              <a:rPr lang="en-GB" dirty="0"/>
+              <a:t>Folders ignored during Azure publishing</a:t>
+            </a:r>
+          </a:p>
+        </p:txBody>
+      </p:sp>
+    </p:spTree>
+    <p:extLst>
+      <p:ext uri="{BB962C8B-B14F-4D97-AF65-F5344CB8AC3E}">
+        <p14:creationId xmlns:p14="http://schemas.microsoft.com/office/powerpoint/2010/main" val="3199722437"/>
+      </p:ext>
+    </p:extLst>
+  </p:cSld>
+  <p:clrMapOvr>
+    <a:masterClrMapping/>
+  </p:clrMapOvr>
+</p:sld>
+</file>
+
 <file path=ppt/theme/theme1.xml><?xml version="1.0" encoding="utf-8"?>
 <a:theme xmlns:a="http://schemas.openxmlformats.org/drawingml/2006/main" name="Office Theme">
   <a:themeElements>

</xml_diff>